<commit_message>
modified UML to reflect the changes made in previous commit to Student class
</commit_message>
<xml_diff>
--- a/ClassDiagramAndEncapsulationActivity/Diagrams/Encapsulation-Student-Class-Diagram.pptx
+++ b/ClassDiagramAndEncapsulationActivity/Diagrams/Encapsulation-Student-Class-Diagram.pptx
@@ -104,6 +104,11 @@
       </a:defRPr>
     </a:lvl9pPr>
   </p:defaultTextStyle>
+  <p:extLst>
+    <p:ext uri="{EFAFB233-063F-42B5-8137-9DF3F51BA10A}">
+      <p15:sldGuideLst xmlns:p15="http://schemas.microsoft.com/office/powerpoint/2012/main"/>
+    </p:ext>
+  </p:extLst>
 </p:presentation>
 </file>
 
@@ -293,7 +298,7 @@
           <a:p>
             <a:fld id="{56F252DE-BE7F-4FD7-9E9D-6E11CD9A62D0}" type="datetimeFigureOut">
               <a:rPr lang="en-GB" smtClean="0"/>
-              <a:t>17/05/2022</a:t>
+              <a:t>26/05/2022</a:t>
             </a:fld>
             <a:endParaRPr lang="en-GB"/>
           </a:p>
@@ -493,7 +498,7 @@
           <a:p>
             <a:fld id="{56F252DE-BE7F-4FD7-9E9D-6E11CD9A62D0}" type="datetimeFigureOut">
               <a:rPr lang="en-GB" smtClean="0"/>
-              <a:t>17/05/2022</a:t>
+              <a:t>26/05/2022</a:t>
             </a:fld>
             <a:endParaRPr lang="en-GB"/>
           </a:p>
@@ -703,7 +708,7 @@
           <a:p>
             <a:fld id="{56F252DE-BE7F-4FD7-9E9D-6E11CD9A62D0}" type="datetimeFigureOut">
               <a:rPr lang="en-GB" smtClean="0"/>
-              <a:t>17/05/2022</a:t>
+              <a:t>26/05/2022</a:t>
             </a:fld>
             <a:endParaRPr lang="en-GB"/>
           </a:p>
@@ -903,7 +908,7 @@
           <a:p>
             <a:fld id="{56F252DE-BE7F-4FD7-9E9D-6E11CD9A62D0}" type="datetimeFigureOut">
               <a:rPr lang="en-GB" smtClean="0"/>
-              <a:t>17/05/2022</a:t>
+              <a:t>26/05/2022</a:t>
             </a:fld>
             <a:endParaRPr lang="en-GB"/>
           </a:p>
@@ -1179,7 +1184,7 @@
           <a:p>
             <a:fld id="{56F252DE-BE7F-4FD7-9E9D-6E11CD9A62D0}" type="datetimeFigureOut">
               <a:rPr lang="en-GB" smtClean="0"/>
-              <a:t>17/05/2022</a:t>
+              <a:t>26/05/2022</a:t>
             </a:fld>
             <a:endParaRPr lang="en-GB"/>
           </a:p>
@@ -1447,7 +1452,7 @@
           <a:p>
             <a:fld id="{56F252DE-BE7F-4FD7-9E9D-6E11CD9A62D0}" type="datetimeFigureOut">
               <a:rPr lang="en-GB" smtClean="0"/>
-              <a:t>17/05/2022</a:t>
+              <a:t>26/05/2022</a:t>
             </a:fld>
             <a:endParaRPr lang="en-GB"/>
           </a:p>
@@ -1862,7 +1867,7 @@
           <a:p>
             <a:fld id="{56F252DE-BE7F-4FD7-9E9D-6E11CD9A62D0}" type="datetimeFigureOut">
               <a:rPr lang="en-GB" smtClean="0"/>
-              <a:t>17/05/2022</a:t>
+              <a:t>26/05/2022</a:t>
             </a:fld>
             <a:endParaRPr lang="en-GB"/>
           </a:p>
@@ -2004,7 +2009,7 @@
           <a:p>
             <a:fld id="{56F252DE-BE7F-4FD7-9E9D-6E11CD9A62D0}" type="datetimeFigureOut">
               <a:rPr lang="en-GB" smtClean="0"/>
-              <a:t>17/05/2022</a:t>
+              <a:t>26/05/2022</a:t>
             </a:fld>
             <a:endParaRPr lang="en-GB"/>
           </a:p>
@@ -2117,7 +2122,7 @@
           <a:p>
             <a:fld id="{56F252DE-BE7F-4FD7-9E9D-6E11CD9A62D0}" type="datetimeFigureOut">
               <a:rPr lang="en-GB" smtClean="0"/>
-              <a:t>17/05/2022</a:t>
+              <a:t>26/05/2022</a:t>
             </a:fld>
             <a:endParaRPr lang="en-GB"/>
           </a:p>
@@ -2430,7 +2435,7 @@
           <a:p>
             <a:fld id="{56F252DE-BE7F-4FD7-9E9D-6E11CD9A62D0}" type="datetimeFigureOut">
               <a:rPr lang="en-GB" smtClean="0"/>
-              <a:t>17/05/2022</a:t>
+              <a:t>26/05/2022</a:t>
             </a:fld>
             <a:endParaRPr lang="en-GB"/>
           </a:p>
@@ -2719,7 +2724,7 @@
           <a:p>
             <a:fld id="{56F252DE-BE7F-4FD7-9E9D-6E11CD9A62D0}" type="datetimeFigureOut">
               <a:rPr lang="en-GB" smtClean="0"/>
-              <a:t>17/05/2022</a:t>
+              <a:t>26/05/2022</a:t>
             </a:fld>
             <a:endParaRPr lang="en-GB"/>
           </a:p>
@@ -2962,7 +2967,7 @@
           <a:p>
             <a:fld id="{56F252DE-BE7F-4FD7-9E9D-6E11CD9A62D0}" type="datetimeFigureOut">
               <a:rPr lang="en-GB" smtClean="0"/>
-              <a:t>17/05/2022</a:t>
+              <a:t>26/05/2022</a:t>
             </a:fld>
             <a:endParaRPr lang="en-GB"/>
           </a:p>
@@ -3394,14 +3399,14 @@
           <p:nvPr>
             <p:extLst>
               <p:ext uri="{D42A27DB-BD31-4B8C-83A1-F6EECF244321}">
-                <p14:modId xmlns:p14="http://schemas.microsoft.com/office/powerpoint/2010/main" val="4206002287"/>
+                <p14:modId xmlns:p14="http://schemas.microsoft.com/office/powerpoint/2010/main" val="1729624499"/>
               </p:ext>
             </p:extLst>
           </p:nvPr>
         </p:nvGraphicFramePr>
         <p:xfrm>
           <a:off x="5085346" y="719664"/>
-          <a:ext cx="2220523" cy="3423127"/>
+          <a:ext cx="2220523" cy="3110836"/>
         </p:xfrm>
         <a:graphic>
           <a:graphicData uri="http://schemas.openxmlformats.org/drawingml/2006/table">
@@ -3418,7 +3423,7 @@
                   </a:extLst>
                 </a:gridCol>
               </a:tblGrid>
-              <a:tr h="435083">
+              <a:tr h="378512">
                 <a:tc>
                   <a:txBody>
                     <a:bodyPr/>
@@ -3481,7 +3486,7 @@
                   </a:ext>
                 </a:extLst>
               </a:tr>
-              <a:tr h="1494022">
+              <a:tr h="1299764">
                 <a:tc>
                   <a:txBody>
                     <a:bodyPr/>
@@ -3498,7 +3503,15 @@
                     <a:p>
                       <a:r>
                         <a:rPr lang="en-GB" sz="1100" dirty="0"/>
-                        <a:t>-Grade: string</a:t>
+                        <a:t>-Grade: </a:t>
+                      </a:r>
+                      <a:r>
+                        <a:rPr lang="en-GB" sz="1100" dirty="0" err="1"/>
+                        <a:t>enum</a:t>
+                      </a:r>
+                      <a:r>
+                        <a:rPr lang="en-GB" sz="1100" dirty="0"/>
+                        <a:t> Grades</a:t>
                       </a:r>
                     </a:p>
                     <a:p>
@@ -3520,16 +3533,13 @@
                       </a:pPr>
                       <a:r>
                         <a:rPr lang="en-GB" sz="1100" dirty="0"/>
-                        <a:t>-</a:t>
+                        <a:t>+Grades: </a:t>
                       </a:r>
                       <a:r>
                         <a:rPr lang="en-GB" sz="1100" dirty="0" err="1"/>
-                        <a:t>validGrades</a:t>
+                        <a:t>enum</a:t>
                       </a:r>
-                      <a:r>
-                        <a:rPr lang="en-GB" sz="1100" dirty="0"/>
-                        <a:t>: string[]</a:t>
-                      </a:r>
+                      <a:endParaRPr lang="en-GB" sz="1100" dirty="0"/>
                     </a:p>
                     <a:p>
                       <a:pPr marL="0" marR="0" lvl="0" indent="0" algn="l" defTabSz="914400" rtl="0" eaLnBrk="1" fontAlgn="auto" latinLnBrk="0" hangingPunct="1">
@@ -3616,7 +3626,7 @@
                   </a:ext>
                 </a:extLst>
               </a:tr>
-              <a:tr h="1494022">
+              <a:tr h="1299764">
                 <a:tc>
                   <a:txBody>
                     <a:bodyPr/>
@@ -3634,35 +3644,6 @@
                       <a:r>
                         <a:rPr lang="en-GB" sz="1100" dirty="0"/>
                         <a:t>+DownGrade(): void</a:t>
-                      </a:r>
-                    </a:p>
-                    <a:p>
-                      <a:r>
-                        <a:rPr lang="en-GB" sz="1100" dirty="0"/>
-                        <a:t>+DisplayStudentName(): void</a:t>
-                      </a:r>
-                    </a:p>
-                    <a:p>
-                      <a:pPr marL="0" marR="0" lvl="0" indent="0" algn="l" defTabSz="914400" rtl="0" eaLnBrk="1" fontAlgn="auto" latinLnBrk="0" hangingPunct="1">
-                        <a:lnSpc>
-                          <a:spcPct val="100000"/>
-                        </a:lnSpc>
-                        <a:spcBef>
-                          <a:spcPts val="0"/>
-                        </a:spcBef>
-                        <a:spcAft>
-                          <a:spcPts val="0"/>
-                        </a:spcAft>
-                        <a:buClrTx/>
-                        <a:buSzTx/>
-                        <a:buFontTx/>
-                        <a:buNone/>
-                        <a:tabLst/>
-                        <a:defRPr/>
-                      </a:pPr>
-                      <a:r>
-                        <a:rPr lang="en-GB" sz="1100" dirty="0"/>
-                        <a:t>+DisplayStudentGroup(): void</a:t>
                       </a:r>
                     </a:p>
                     <a:p>
@@ -3725,37 +3706,6 @@
                       <a:r>
                         <a:rPr lang="en-GB" sz="1100" dirty="0"/>
                         <a:t>(): void</a:t>
-                      </a:r>
-                    </a:p>
-                    <a:p>
-                      <a:pPr marL="0" marR="0" lvl="0" indent="0" algn="l" defTabSz="914400" rtl="0" eaLnBrk="1" fontAlgn="auto" latinLnBrk="0" hangingPunct="1">
-                        <a:lnSpc>
-                          <a:spcPct val="100000"/>
-                        </a:lnSpc>
-                        <a:spcBef>
-                          <a:spcPts val="0"/>
-                        </a:spcBef>
-                        <a:spcAft>
-                          <a:spcPts val="0"/>
-                        </a:spcAft>
-                        <a:buClrTx/>
-                        <a:buSzTx/>
-                        <a:buFontTx/>
-                        <a:buNone/>
-                        <a:tabLst/>
-                        <a:defRPr/>
-                      </a:pPr>
-                      <a:r>
-                        <a:rPr lang="en-GB" sz="1100" dirty="0"/>
-                        <a:t>+</a:t>
-                      </a:r>
-                      <a:r>
-                        <a:rPr lang="en-GB" sz="1100" dirty="0" err="1"/>
-                        <a:t>GetInstance</a:t>
-                      </a:r>
-                      <a:r>
-                        <a:rPr lang="en-GB" sz="1100" dirty="0"/>
-                        <a:t>(): Student</a:t>
                       </a:r>
                     </a:p>
                   </a:txBody>

</xml_diff>